<commit_message>
v1.1 of charter discussion slide deck
</commit_message>
<xml_diff>
--- a/msr6-bof-eckert-why-and-how.pptx
+++ b/msr6-bof-eckert-why-and-how.pptx
@@ -3247,7 +3247,7 @@
         </p:nvSpPr>
         <p:spPr bwMode="auto">
           <a:xfrm flipH="0" flipV="0">
-            <a:off x="728135" y="2649537"/>
+            <a:off x="728135" y="2649536"/>
             <a:ext cx="10897245" cy="3775800"/>
           </a:xfrm>
         </p:spPr>
@@ -3272,7 +3272,7 @@
             </a:pPr>
             <a:r>
               <a:rPr lang="en-US" sz="3600"/>
-              <a:t>v1.0 - 07/14/2022</a:t>
+              <a:t>v1.1 - 07/25/2022</a:t>
             </a:r>
             <a:endParaRPr lang="en-US"/>
           </a:p>
@@ -3964,7 +3964,7 @@
         <p:spPr bwMode="auto">
           <a:xfrm flipH="0" flipV="0">
             <a:off x="199084" y="2580873"/>
-            <a:ext cx="1589069" cy="1005876"/>
+            <a:ext cx="1589068" cy="1005876"/>
           </a:xfrm>
           <a:prstGeom prst="rect">
             <a:avLst/>
@@ -5752,7 +5752,7 @@
         </p:nvCxnSpPr>
         <p:spPr bwMode="auto">
           <a:xfrm rot="0" flipH="0" flipV="0">
-            <a:off x="8222286" y="5105587"/>
+            <a:off x="8222285" y="5105587"/>
             <a:ext cx="423038" cy="192367"/>
           </a:xfrm>
           <a:prstGeom prst="line">
@@ -5880,7 +5880,7 @@
         <p:spPr bwMode="auto">
           <a:xfrm flipH="1" flipV="1">
             <a:off x="6303195" y="3003294"/>
-            <a:ext cx="1497320" cy="1666917"/>
+            <a:ext cx="1497319" cy="1666917"/>
           </a:xfrm>
           <a:prstGeom prst="curvedRightArrow">
             <a:avLst>
@@ -6539,7 +6539,7 @@
         <p:spPr bwMode="auto">
           <a:xfrm flipH="0" flipV="0">
             <a:off x="199084" y="2580873"/>
-            <a:ext cx="1589069" cy="1005876"/>
+            <a:ext cx="1589068" cy="1005876"/>
           </a:xfrm>
           <a:prstGeom prst="rect">
             <a:avLst/>
@@ -8094,7 +8094,7 @@
         </p:nvSpPr>
         <p:spPr bwMode="auto">
           <a:xfrm flipH="0" flipV="0">
-            <a:off x="8222286" y="3835018"/>
+            <a:off x="8222285" y="3835018"/>
             <a:ext cx="1369255" cy="274356"/>
           </a:xfrm>
           <a:prstGeom prst="rect">
@@ -8210,7 +8210,7 @@
         </p:nvSpPr>
         <p:spPr bwMode="auto">
           <a:xfrm flipH="0" flipV="0">
-            <a:off x="3471639" y="3715683"/>
+            <a:off x="3471639" y="3715682"/>
             <a:ext cx="2071492" cy="1188755"/>
           </a:xfrm>
           <a:prstGeom prst="rect">
@@ -8679,7 +8679,7 @@
         </p:nvCxnSpPr>
         <p:spPr bwMode="auto">
           <a:xfrm rot="0" flipH="0" flipV="0">
-            <a:off x="8222286" y="5105587"/>
+            <a:off x="8222285" y="5105587"/>
             <a:ext cx="423038" cy="192367"/>
           </a:xfrm>
           <a:prstGeom prst="line">
@@ -9058,7 +9058,7 @@
         </p:nvSpPr>
         <p:spPr bwMode="auto">
           <a:xfrm flipH="0" flipV="0">
-            <a:off x="838199" y="7937"/>
+            <a:off x="838198" y="7937"/>
             <a:ext cx="10515600" cy="1123156"/>
           </a:xfrm>
         </p:spPr>
@@ -9107,42 +9107,24 @@
         </p:nvSpPr>
         <p:spPr bwMode="auto">
           <a:xfrm flipH="0" flipV="0">
-            <a:off x="838199" y="988218"/>
+            <a:off x="838198" y="988218"/>
             <a:ext cx="10515600" cy="5464968"/>
           </a:xfrm>
         </p:spPr>
         <p:txBody>
           <a:bodyPr vertOverflow="overflow" horzOverflow="clip" vert="horz" wrap="square" lIns="91440" tIns="45720" rIns="91440" bIns="45720" numCol="1" spcCol="0" rtlCol="0" fromWordArt="0" anchor="t" anchorCtr="0" forceAA="0" upright="0" compatLnSpc="0">
-            <a:normAutofit fontScale="70000" lnSpcReduction="6000"/>
+            <a:normAutofit fontScale="80000" lnSpcReduction="4000"/>
           </a:bodyPr>
           <a:lstStyle/>
           <a:p>
-            <a:pPr lvl="0">
+            <a:pPr marL="0" lvl="0" indent="0">
+              <a:buFont typeface="Arial"/>
+              <a:buNone/>
               <a:defRPr/>
             </a:pPr>
             <a:r>
               <a:rPr/>
-              <a:t>Thank you for raising IETF std. concern #1</a:t>
-            </a:r>
-            <a:endParaRPr/>
-          </a:p>
-          <a:p>
-            <a:pPr lvl="1">
-              <a:defRPr/>
-            </a:pPr>
-            <a:r>
-              <a:rPr/>
-              <a:t>No tongue in cheek. This IS important!</a:t>
-            </a:r>
-            <a:endParaRPr/>
-          </a:p>
-          <a:p>
-            <a:pPr lvl="0">
-              <a:defRPr/>
-            </a:pPr>
-            <a:r>
-              <a:rPr/>
-              <a:t>No! There already is enough global warming ;-(</a:t>
+              <a:t>Important ! No, we do not. This is how</a:t>
             </a:r>
             <a:endParaRPr/>
           </a:p>
@@ -9166,7 +9148,27 @@
             </a:pPr>
             <a:r>
               <a:rPr/>
-              <a:t>Select Top “Minimum Viable Solution(s)” (MVS) – low complexity, big deployment gain</a:t>
+              <a:t>Select Top “Minimum Viable Solution(s)” (MVS)</a:t>
+            </a:r>
+            <a:endParaRPr/>
+          </a:p>
+          <a:p>
+            <a:pPr lvl="1">
+              <a:defRPr/>
+            </a:pPr>
+            <a:r>
+              <a:rPr/>
+              <a:t>Best use-case solution that can be first specified / deployed:</a:t>
+            </a:r>
+            <a:endParaRPr/>
+          </a:p>
+          <a:p>
+            <a:pPr lvl="1">
+              <a:defRPr/>
+            </a:pPr>
+            <a:r>
+              <a:rPr/>
+              <a:t>Low complexity, big deployment gain</a:t>
             </a:r>
             <a:endParaRPr/>
           </a:p>
@@ -9183,7 +9185,7 @@
             </a:br>
             <a:r>
               <a:rPr/>
-              <a:t>(not necessarily MSR6 drafts only, but e.g.: 6MAN, LSR)</a:t>
+              <a:t>(not only MSR6 drafts, but also dependencies, e.g:  6MAN, LSR)</a:t>
             </a:r>
             <a:endParaRPr/>
           </a:p>
@@ -9205,7 +9207,7 @@
             </a:pPr>
             <a:r>
               <a:rPr/>
-              <a:t>Constrain MSR6 solution documents scope based on MVS, so they can be ready together with functional spec</a:t>
+              <a:t>Constrain MSR6 arch/solution documents scope based on MVS, so they can be ready together with functional spec</a:t>
             </a:r>
             <a:endParaRPr/>
           </a:p>
@@ -9215,44 +9217,51 @@
             </a:pPr>
             <a:r>
               <a:rPr/>
-              <a:t>There are always –bis RFCs. And those could be started in parallel (individually) to track future work. They just will not be given WG adoption/cycles/review until it’s their time to be worked on (serialization!) (many WGs have such work hanging individually for years to ensure MVS work is prioritized).</a:t>
+              <a:t>There are always “–bis” RFCs. arch/solution aspects beyond MVS can go into –bis, so we focus work on solution documents REQUIRED for MVS.</a:t>
             </a:r>
             <a:endParaRPr/>
           </a:p>
           <a:p>
+            <a:pPr lvl="0">
+              <a:defRPr/>
+            </a:pPr>
+            <a:r>
+              <a:rPr/>
+              <a:t>NOT rocket science.</a:t>
+            </a:r>
+            <a:endParaRPr/>
+          </a:p>
+          <a:p>
             <a:pPr lvl="1">
               <a:defRPr/>
             </a:pPr>
             <a:r>
               <a:rPr/>
-              <a:t>If need be (AD concerns about boiling): Constrain charter to MVS, expand later.</a:t>
+              <a:t>Just good WG / charter / milestone stewardship.</a:t>
             </a:r>
             <a:endParaRPr/>
           </a:p>
           <a:p>
-            <a:pPr lvl="0">
+            <a:pPr lvl="1">
               <a:defRPr/>
             </a:pPr>
             <a:r>
               <a:rPr/>
-              <a:t>This is NOT rocket science. Just good WG / solution stewardship.</a:t>
+              <a:t>Learned / exercised from, e.g. :</a:t>
+            </a:r>
+            <a:r>
+              <a:rPr/>
+              <a:t> ROLL, SPRING, BIER for example!.</a:t>
             </a:r>
             <a:endParaRPr/>
           </a:p>
           <a:p>
-            <a:pPr lvl="1">
+            <a:pPr lvl="2">
               <a:defRPr/>
             </a:pPr>
             <a:r>
               <a:rPr/>
-              <a:t>Yes, IETF is best at “small” incremental work, </a:t>
-            </a:r>
-            <a:br>
-              <a:rPr/>
-            </a:br>
-            <a:r>
-              <a:rPr/>
-              <a:t>but we have learned how to grow solutions that way (ROLL, SPRING, BIER for example!).</a:t>
+              <a:t>Also, what not to try (e.g.: break RFC8200).</a:t>
             </a:r>
             <a:endParaRPr/>
           </a:p>
@@ -9304,7 +9313,7 @@
         <p:spPr bwMode="auto">
           <a:xfrm flipH="0" flipV="0">
             <a:off x="608437" y="246062"/>
-            <a:ext cx="10685831" cy="885031"/>
+            <a:ext cx="10685830" cy="885031"/>
           </a:xfrm>
         </p:spPr>
         <p:txBody>
@@ -9925,7 +9934,7 @@
         </p:nvCxnSpPr>
         <p:spPr bwMode="auto">
           <a:xfrm rot="0" flipH="0" flipV="0">
-            <a:off x="8222286" y="5105587"/>
+            <a:off x="8222285" y="5105587"/>
             <a:ext cx="423038" cy="192367"/>
           </a:xfrm>
           <a:prstGeom prst="line">
@@ -10574,7 +10583,7 @@
         </p:nvSpPr>
         <p:spPr bwMode="auto">
           <a:xfrm>
-            <a:off x="572718" y="43656"/>
+            <a:off x="572718" y="43655"/>
             <a:ext cx="10515600" cy="1325562"/>
           </a:xfrm>
         </p:spPr>

</xml_diff>